<commit_message>
refs #165 Draft Präsentation erstellt
</commit_message>
<xml_diff>
--- a/doc/05_Design/praesentation.pptx
+++ b/doc/05_Design/praesentation.pptx
@@ -13,6 +13,21 @@
   <p:sldIdLst>
     <p:sldId id="256" r:id="rId8"/>
     <p:sldId id="257" r:id="rId9"/>
+    <p:sldId id="258" r:id="rId10"/>
+    <p:sldId id="259" r:id="rId11"/>
+    <p:sldId id="262" r:id="rId12"/>
+    <p:sldId id="263" r:id="rId13"/>
+    <p:sldId id="260" r:id="rId14"/>
+    <p:sldId id="261" r:id="rId15"/>
+    <p:sldId id="264" r:id="rId16"/>
+    <p:sldId id="265" r:id="rId17"/>
+    <p:sldId id="267" r:id="rId18"/>
+    <p:sldId id="266" r:id="rId19"/>
+    <p:sldId id="268" r:id="rId20"/>
+    <p:sldId id="269" r:id="rId21"/>
+    <p:sldId id="270" r:id="rId22"/>
+    <p:sldId id="271" r:id="rId23"/>
+    <p:sldId id="272" r:id="rId24"/>
   </p:sldIdLst>
   <p:sldSz cx="9144000" cy="6858000" type="screen4x3"/>
   <p:notesSz cx="6858000" cy="9144000"/>
@@ -36591,29 +36606,62 @@
         </p:nvSpPr>
         <p:spPr/>
         <p:txBody>
+          <a:bodyPr>
+            <a:normAutofit fontScale="90000"/>
+          </a:bodyPr>
+          <a:lstStyle/>
+          <a:p>
+            <a:r>
+              <a:rPr lang="de-CH" dirty="0" smtClean="0"/>
+              <a:t>Mobile Reporting Tool</a:t>
+            </a:r>
+            <a:br>
+              <a:rPr lang="de-CH" dirty="0" smtClean="0"/>
+            </a:br>
+            <a:r>
+              <a:rPr lang="de-CH" dirty="0" smtClean="0"/>
+              <a:t>MS3 Ende Elaboration</a:t>
+            </a:r>
+            <a:br>
+              <a:rPr lang="de-CH" dirty="0" smtClean="0"/>
+            </a:br>
+            <a:r>
+              <a:rPr lang="de-CH" dirty="0" smtClean="0"/>
+              <a:t>Architektur, Prototyp</a:t>
+            </a:r>
+            <a:endParaRPr lang="de-CH" dirty="0"/>
+          </a:p>
+        </p:txBody>
+      </p:sp>
+      <p:sp>
+        <p:nvSpPr>
+          <p:cNvPr id="3" name="Untertitel 2"/>
+          <p:cNvSpPr>
+            <a:spLocks noGrp="1"/>
+          </p:cNvSpPr>
+          <p:nvPr>
+            <p:ph type="subTitle" idx="1"/>
+          </p:nvPr>
+        </p:nvSpPr>
+        <p:spPr/>
+        <p:txBody>
           <a:bodyPr/>
           <a:lstStyle/>
           <a:p>
-            <a:endParaRPr lang="de-CH"/>
-          </a:p>
-        </p:txBody>
-      </p:sp>
-      <p:sp>
-        <p:nvSpPr>
-          <p:cNvPr id="3" name="Untertitel 2"/>
-          <p:cNvSpPr>
-            <a:spLocks noGrp="1"/>
-          </p:cNvSpPr>
-          <p:nvPr>
-            <p:ph type="subTitle" idx="1"/>
-          </p:nvPr>
-        </p:nvSpPr>
-        <p:spPr/>
-        <p:txBody>
-          <a:bodyPr/>
-          <a:lstStyle/>
-          <a:p>
-            <a:endParaRPr lang="de-CH"/>
+            <a:pPr algn="ctr"/>
+            <a:r>
+              <a:rPr lang="de-CH" dirty="0" smtClean="0"/>
+              <a:t>Diego Steiner, Delia </a:t>
+            </a:r>
+            <a:r>
+              <a:rPr lang="de-CH" dirty="0" err="1" smtClean="0"/>
+              <a:t>Treichler</a:t>
+            </a:r>
+            <a:r>
+              <a:rPr lang="de-CH" dirty="0" smtClean="0"/>
+              <a:t>, Lukas Elmer, Christina Heidt, Remo Waltenspül </a:t>
+            </a:r>
+            <a:endParaRPr lang="de-CH" dirty="0"/>
           </a:p>
         </p:txBody>
       </p:sp>
@@ -36621,6 +36669,701 @@
     <p:extLst>
       <p:ext uri="{BB962C8B-B14F-4D97-AF65-F5344CB8AC3E}">
         <p14:creationId xmlns:p14="http://schemas.microsoft.com/office/powerpoint/2010/main" val="1479270911"/>
+      </p:ext>
+    </p:extLst>
+  </p:cSld>
+  <p:clrMapOvr>
+    <a:masterClrMapping/>
+  </p:clrMapOvr>
+  <p:transition/>
+  <p:timing>
+    <p:tnLst>
+      <p:par>
+        <p:cTn id="1" dur="indefinite" restart="never" nodeType="tmRoot"/>
+      </p:par>
+    </p:tnLst>
+  </p:timing>
+</p:sld>
+</file>
+
+<file path=ppt/slides/slide10.xml><?xml version="1.0" encoding="utf-8"?>
+<p:sld xmlns:a="http://schemas.openxmlformats.org/drawingml/2006/main" xmlns:r="http://schemas.openxmlformats.org/officeDocument/2006/relationships" xmlns:p="http://schemas.openxmlformats.org/presentationml/2006/main">
+  <p:cSld>
+    <p:spTree>
+      <p:nvGrpSpPr>
+        <p:cNvPr id="1" name=""/>
+        <p:cNvGrpSpPr/>
+        <p:nvPr/>
+      </p:nvGrpSpPr>
+      <p:grpSpPr>
+        <a:xfrm>
+          <a:off x="0" y="0"/>
+          <a:ext cx="0" cy="0"/>
+          <a:chOff x="0" y="0"/>
+          <a:chExt cx="0" cy="0"/>
+        </a:xfrm>
+      </p:grpSpPr>
+      <p:sp>
+        <p:nvSpPr>
+          <p:cNvPr id="2" name="Inhaltsplatzhalter 1"/>
+          <p:cNvSpPr>
+            <a:spLocks noGrp="1"/>
+          </p:cNvSpPr>
+          <p:nvPr>
+            <p:ph idx="1"/>
+          </p:nvPr>
+        </p:nvSpPr>
+        <p:spPr/>
+        <p:txBody>
+          <a:bodyPr/>
+          <a:lstStyle/>
+          <a:p>
+            <a:endParaRPr lang="de-CH"/>
+          </a:p>
+        </p:txBody>
+      </p:sp>
+      <p:sp>
+        <p:nvSpPr>
+          <p:cNvPr id="3" name="Titel 2"/>
+          <p:cNvSpPr>
+            <a:spLocks noGrp="1"/>
+          </p:cNvSpPr>
+          <p:nvPr>
+            <p:ph type="title"/>
+          </p:nvPr>
+        </p:nvSpPr>
+        <p:spPr/>
+        <p:txBody>
+          <a:bodyPr/>
+          <a:lstStyle/>
+          <a:p>
+            <a:r>
+              <a:rPr lang="de-CH" dirty="0" smtClean="0"/>
+              <a:t>Packages</a:t>
+            </a:r>
+            <a:endParaRPr lang="de-CH" dirty="0"/>
+          </a:p>
+        </p:txBody>
+      </p:sp>
+    </p:spTree>
+    <p:extLst>
+      <p:ext uri="{BB962C8B-B14F-4D97-AF65-F5344CB8AC3E}">
+        <p14:creationId xmlns:p14="http://schemas.microsoft.com/office/powerpoint/2010/main" val="1515303313"/>
+      </p:ext>
+    </p:extLst>
+  </p:cSld>
+  <p:clrMapOvr>
+    <a:masterClrMapping/>
+  </p:clrMapOvr>
+  <p:transition/>
+  <p:timing>
+    <p:tnLst>
+      <p:par>
+        <p:cTn id="1" dur="indefinite" restart="never" nodeType="tmRoot"/>
+      </p:par>
+    </p:tnLst>
+  </p:timing>
+</p:sld>
+</file>
+
+<file path=ppt/slides/slide11.xml><?xml version="1.0" encoding="utf-8"?>
+<p:sld xmlns:a="http://schemas.openxmlformats.org/drawingml/2006/main" xmlns:r="http://schemas.openxmlformats.org/officeDocument/2006/relationships" xmlns:p="http://schemas.openxmlformats.org/presentationml/2006/main">
+  <p:cSld>
+    <p:spTree>
+      <p:nvGrpSpPr>
+        <p:cNvPr id="1" name=""/>
+        <p:cNvGrpSpPr/>
+        <p:nvPr/>
+      </p:nvGrpSpPr>
+      <p:grpSpPr>
+        <a:xfrm>
+          <a:off x="0" y="0"/>
+          <a:ext cx="0" cy="0"/>
+          <a:chOff x="0" y="0"/>
+          <a:chExt cx="0" cy="0"/>
+        </a:xfrm>
+      </p:grpSpPr>
+      <p:sp>
+        <p:nvSpPr>
+          <p:cNvPr id="2" name="Inhaltsplatzhalter 1"/>
+          <p:cNvSpPr>
+            <a:spLocks noGrp="1"/>
+          </p:cNvSpPr>
+          <p:nvPr>
+            <p:ph idx="1"/>
+          </p:nvPr>
+        </p:nvSpPr>
+        <p:spPr/>
+        <p:txBody>
+          <a:bodyPr/>
+          <a:lstStyle/>
+          <a:p>
+            <a:endParaRPr lang="de-CH" dirty="0"/>
+          </a:p>
+        </p:txBody>
+      </p:sp>
+      <p:sp>
+        <p:nvSpPr>
+          <p:cNvPr id="3" name="Titel 2"/>
+          <p:cNvSpPr>
+            <a:spLocks noGrp="1"/>
+          </p:cNvSpPr>
+          <p:nvPr>
+            <p:ph type="title"/>
+          </p:nvPr>
+        </p:nvSpPr>
+        <p:spPr/>
+        <p:txBody>
+          <a:bodyPr/>
+          <a:lstStyle/>
+          <a:p>
+            <a:r>
+              <a:rPr lang="de-CH" dirty="0" smtClean="0"/>
+              <a:t>Architekturentscheidungen</a:t>
+            </a:r>
+            <a:endParaRPr lang="de-CH" dirty="0"/>
+          </a:p>
+        </p:txBody>
+      </p:sp>
+    </p:spTree>
+    <p:extLst>
+      <p:ext uri="{BB962C8B-B14F-4D97-AF65-F5344CB8AC3E}">
+        <p14:creationId xmlns:p14="http://schemas.microsoft.com/office/powerpoint/2010/main" val="3935725331"/>
+      </p:ext>
+    </p:extLst>
+  </p:cSld>
+  <p:clrMapOvr>
+    <a:masterClrMapping/>
+  </p:clrMapOvr>
+  <p:transition/>
+  <p:timing>
+    <p:tnLst>
+      <p:par>
+        <p:cTn id="1" dur="indefinite" restart="never" nodeType="tmRoot"/>
+      </p:par>
+    </p:tnLst>
+  </p:timing>
+</p:sld>
+</file>
+
+<file path=ppt/slides/slide12.xml><?xml version="1.0" encoding="utf-8"?>
+<p:sld xmlns:a="http://schemas.openxmlformats.org/drawingml/2006/main" xmlns:r="http://schemas.openxmlformats.org/officeDocument/2006/relationships" xmlns:p="http://schemas.openxmlformats.org/presentationml/2006/main">
+  <p:cSld>
+    <p:spTree>
+      <p:nvGrpSpPr>
+        <p:cNvPr id="1" name=""/>
+        <p:cNvGrpSpPr/>
+        <p:nvPr/>
+      </p:nvGrpSpPr>
+      <p:grpSpPr>
+        <a:xfrm>
+          <a:off x="0" y="0"/>
+          <a:ext cx="0" cy="0"/>
+          <a:chOff x="0" y="0"/>
+          <a:chExt cx="0" cy="0"/>
+        </a:xfrm>
+      </p:grpSpPr>
+      <p:sp>
+        <p:nvSpPr>
+          <p:cNvPr id="3" name="Titel 2"/>
+          <p:cNvSpPr>
+            <a:spLocks noGrp="1"/>
+          </p:cNvSpPr>
+          <p:nvPr>
+            <p:ph type="title"/>
+          </p:nvPr>
+        </p:nvSpPr>
+        <p:spPr/>
+        <p:txBody>
+          <a:bodyPr/>
+          <a:lstStyle/>
+          <a:p>
+            <a:r>
+              <a:rPr lang="de-CH" dirty="0" smtClean="0"/>
+              <a:t>Problemdomain </a:t>
+            </a:r>
+            <a:r>
+              <a:rPr lang="de-CH" dirty="0" err="1" smtClean="0"/>
+              <a:t>Android</a:t>
+            </a:r>
+            <a:endParaRPr lang="de-CH" dirty="0"/>
+          </a:p>
+        </p:txBody>
+      </p:sp>
+      <p:pic>
+        <p:nvPicPr>
+          <p:cNvPr id="1026" name="Picture 2"/>
+          <p:cNvPicPr>
+            <a:picLocks noChangeAspect="1" noChangeArrowheads="1"/>
+          </p:cNvPicPr>
+          <p:nvPr/>
+        </p:nvPicPr>
+        <p:blipFill>
+          <a:blip r:embed="rId2">
+            <a:extLst>
+              <a:ext uri="{28A0092B-C50C-407E-A947-70E740481C1C}">
+                <a14:useLocalDpi xmlns:a14="http://schemas.microsoft.com/office/drawing/2010/main" val="0"/>
+              </a:ext>
+            </a:extLst>
+          </a:blip>
+          <a:srcRect/>
+          <a:stretch>
+            <a:fillRect/>
+          </a:stretch>
+        </p:blipFill>
+        <p:spPr bwMode="auto">
+          <a:xfrm>
+            <a:off x="1115616" y="1320550"/>
+            <a:ext cx="7374632" cy="5015543"/>
+          </a:xfrm>
+          <a:prstGeom prst="rect">
+            <a:avLst/>
+          </a:prstGeom>
+          <a:noFill/>
+          <a:ln>
+            <a:noFill/>
+          </a:ln>
+          <a:effectLst/>
+          <a:extLst>
+            <a:ext uri="{909E8E84-426E-40DD-AFC4-6F175D3DCCD1}">
+              <a14:hiddenFill xmlns:a14="http://schemas.microsoft.com/office/drawing/2010/main">
+                <a:solidFill>
+                  <a:schemeClr val="accent1"/>
+                </a:solidFill>
+              </a14:hiddenFill>
+            </a:ext>
+            <a:ext uri="{91240B29-F687-4F45-9708-019B960494DF}">
+              <a14:hiddenLine xmlns:a14="http://schemas.microsoft.com/office/drawing/2010/main" w="9525">
+                <a:solidFill>
+                  <a:schemeClr val="tx1"/>
+                </a:solidFill>
+                <a:miter lim="800000"/>
+                <a:headEnd/>
+                <a:tailEnd/>
+              </a14:hiddenLine>
+            </a:ext>
+            <a:ext uri="{AF507438-7753-43E0-B8FC-AC1667EBCBE1}">
+              <a14:hiddenEffects xmlns:a14="http://schemas.microsoft.com/office/drawing/2010/main">
+                <a:effectLst>
+                  <a:outerShdw dist="35921" dir="2700000" algn="ctr" rotWithShape="0">
+                    <a:schemeClr val="bg2"/>
+                  </a:outerShdw>
+                </a:effectLst>
+              </a14:hiddenEffects>
+            </a:ext>
+          </a:extLst>
+        </p:spPr>
+      </p:pic>
+    </p:spTree>
+    <p:extLst>
+      <p:ext uri="{BB962C8B-B14F-4D97-AF65-F5344CB8AC3E}">
+        <p14:creationId xmlns:p14="http://schemas.microsoft.com/office/powerpoint/2010/main" val="1752878550"/>
+      </p:ext>
+    </p:extLst>
+  </p:cSld>
+  <p:clrMapOvr>
+    <a:masterClrMapping/>
+  </p:clrMapOvr>
+  <p:transition/>
+  <p:timing>
+    <p:tnLst>
+      <p:par>
+        <p:cTn id="1" dur="indefinite" restart="never" nodeType="tmRoot"/>
+      </p:par>
+    </p:tnLst>
+  </p:timing>
+</p:sld>
+</file>
+
+<file path=ppt/slides/slide13.xml><?xml version="1.0" encoding="utf-8"?>
+<p:sld xmlns:a="http://schemas.openxmlformats.org/drawingml/2006/main" xmlns:r="http://schemas.openxmlformats.org/officeDocument/2006/relationships" xmlns:p="http://schemas.openxmlformats.org/presentationml/2006/main">
+  <p:cSld>
+    <p:spTree>
+      <p:nvGrpSpPr>
+        <p:cNvPr id="1" name=""/>
+        <p:cNvGrpSpPr/>
+        <p:nvPr/>
+      </p:nvGrpSpPr>
+      <p:grpSpPr>
+        <a:xfrm>
+          <a:off x="0" y="0"/>
+          <a:ext cx="0" cy="0"/>
+          <a:chOff x="0" y="0"/>
+          <a:chExt cx="0" cy="0"/>
+        </a:xfrm>
+      </p:grpSpPr>
+      <p:pic>
+        <p:nvPicPr>
+          <p:cNvPr id="2050" name="Picture 2"/>
+          <p:cNvPicPr>
+            <a:picLocks noChangeAspect="1" noChangeArrowheads="1"/>
+          </p:cNvPicPr>
+          <p:nvPr/>
+        </p:nvPicPr>
+        <p:blipFill>
+          <a:blip r:embed="rId2">
+            <a:extLst>
+              <a:ext uri="{28A0092B-C50C-407E-A947-70E740481C1C}">
+                <a14:useLocalDpi xmlns:a14="http://schemas.microsoft.com/office/drawing/2010/main" val="0"/>
+              </a:ext>
+            </a:extLst>
+          </a:blip>
+          <a:srcRect/>
+          <a:stretch>
+            <a:fillRect/>
+          </a:stretch>
+        </p:blipFill>
+        <p:spPr bwMode="auto">
+          <a:xfrm>
+            <a:off x="84584" y="117379"/>
+            <a:ext cx="7056784" cy="6692092"/>
+          </a:xfrm>
+          <a:prstGeom prst="rect">
+            <a:avLst/>
+          </a:prstGeom>
+          <a:noFill/>
+          <a:ln>
+            <a:noFill/>
+          </a:ln>
+          <a:effectLst/>
+        </p:spPr>
+      </p:pic>
+      <p:sp>
+        <p:nvSpPr>
+          <p:cNvPr id="3" name="Titel 2"/>
+          <p:cNvSpPr>
+            <a:spLocks noGrp="1"/>
+          </p:cNvSpPr>
+          <p:nvPr>
+            <p:ph type="title"/>
+          </p:nvPr>
+        </p:nvSpPr>
+        <p:spPr>
+          <a:xfrm>
+            <a:off x="6020072" y="836712"/>
+            <a:ext cx="2242592" cy="1930226"/>
+          </a:xfrm>
+          <a:solidFill>
+            <a:schemeClr val="bg1"/>
+          </a:solidFill>
+        </p:spPr>
+        <p:txBody>
+          <a:bodyPr>
+            <a:normAutofit fontScale="90000"/>
+          </a:bodyPr>
+          <a:lstStyle/>
+          <a:p>
+            <a:r>
+              <a:rPr lang="de-CH" dirty="0" smtClean="0"/>
+              <a:t>Problemdomain Server</a:t>
+            </a:r>
+            <a:endParaRPr lang="de-CH" dirty="0"/>
+          </a:p>
+        </p:txBody>
+      </p:sp>
+    </p:spTree>
+    <p:extLst>
+      <p:ext uri="{BB962C8B-B14F-4D97-AF65-F5344CB8AC3E}">
+        <p14:creationId xmlns:p14="http://schemas.microsoft.com/office/powerpoint/2010/main" val="3846578893"/>
+      </p:ext>
+    </p:extLst>
+  </p:cSld>
+  <p:clrMapOvr>
+    <a:masterClrMapping/>
+  </p:clrMapOvr>
+  <p:transition/>
+  <p:timing>
+    <p:tnLst>
+      <p:par>
+        <p:cTn id="1" dur="indefinite" restart="never" nodeType="tmRoot"/>
+      </p:par>
+    </p:tnLst>
+  </p:timing>
+</p:sld>
+</file>
+
+<file path=ppt/slides/slide14.xml><?xml version="1.0" encoding="utf-8"?>
+<p:sld xmlns:a="http://schemas.openxmlformats.org/drawingml/2006/main" xmlns:r="http://schemas.openxmlformats.org/officeDocument/2006/relationships" xmlns:p="http://schemas.openxmlformats.org/presentationml/2006/main">
+  <p:cSld>
+    <p:spTree>
+      <p:nvGrpSpPr>
+        <p:cNvPr id="1" name=""/>
+        <p:cNvGrpSpPr/>
+        <p:nvPr/>
+      </p:nvGrpSpPr>
+      <p:grpSpPr>
+        <a:xfrm>
+          <a:off x="0" y="0"/>
+          <a:ext cx="0" cy="0"/>
+          <a:chOff x="0" y="0"/>
+          <a:chExt cx="0" cy="0"/>
+        </a:xfrm>
+      </p:grpSpPr>
+      <p:sp>
+        <p:nvSpPr>
+          <p:cNvPr id="2" name="Inhaltsplatzhalter 1"/>
+          <p:cNvSpPr>
+            <a:spLocks noGrp="1"/>
+          </p:cNvSpPr>
+          <p:nvPr>
+            <p:ph idx="1"/>
+          </p:nvPr>
+        </p:nvSpPr>
+        <p:spPr/>
+        <p:txBody>
+          <a:bodyPr/>
+          <a:lstStyle/>
+          <a:p>
+            <a:endParaRPr lang="de-CH"/>
+          </a:p>
+        </p:txBody>
+      </p:sp>
+      <p:sp>
+        <p:nvSpPr>
+          <p:cNvPr id="3" name="Titel 2"/>
+          <p:cNvSpPr>
+            <a:spLocks noGrp="1"/>
+          </p:cNvSpPr>
+          <p:nvPr>
+            <p:ph type="title"/>
+          </p:nvPr>
+        </p:nvSpPr>
+        <p:spPr/>
+        <p:txBody>
+          <a:bodyPr/>
+          <a:lstStyle/>
+          <a:p>
+            <a:r>
+              <a:rPr lang="de-CH" dirty="0" smtClean="0"/>
+              <a:t>User Interface</a:t>
+            </a:r>
+            <a:endParaRPr lang="de-CH" dirty="0"/>
+          </a:p>
+        </p:txBody>
+      </p:sp>
+    </p:spTree>
+    <p:extLst>
+      <p:ext uri="{BB962C8B-B14F-4D97-AF65-F5344CB8AC3E}">
+        <p14:creationId xmlns:p14="http://schemas.microsoft.com/office/powerpoint/2010/main" val="966300946"/>
+      </p:ext>
+    </p:extLst>
+  </p:cSld>
+  <p:clrMapOvr>
+    <a:masterClrMapping/>
+  </p:clrMapOvr>
+  <p:transition/>
+</p:sld>
+</file>
+
+<file path=ppt/slides/slide15.xml><?xml version="1.0" encoding="utf-8"?>
+<p:sld xmlns:a="http://schemas.openxmlformats.org/drawingml/2006/main" xmlns:r="http://schemas.openxmlformats.org/officeDocument/2006/relationships" xmlns:p="http://schemas.openxmlformats.org/presentationml/2006/main">
+  <p:cSld>
+    <p:spTree>
+      <p:nvGrpSpPr>
+        <p:cNvPr id="1" name=""/>
+        <p:cNvGrpSpPr/>
+        <p:nvPr/>
+      </p:nvGrpSpPr>
+      <p:grpSpPr>
+        <a:xfrm>
+          <a:off x="0" y="0"/>
+          <a:ext cx="0" cy="0"/>
+          <a:chOff x="0" y="0"/>
+          <a:chExt cx="0" cy="0"/>
+        </a:xfrm>
+      </p:grpSpPr>
+      <p:sp>
+        <p:nvSpPr>
+          <p:cNvPr id="2" name="Inhaltsplatzhalter 1"/>
+          <p:cNvSpPr>
+            <a:spLocks noGrp="1"/>
+          </p:cNvSpPr>
+          <p:nvPr>
+            <p:ph idx="1"/>
+          </p:nvPr>
+        </p:nvSpPr>
+        <p:spPr/>
+        <p:txBody>
+          <a:bodyPr/>
+          <a:lstStyle/>
+          <a:p>
+            <a:endParaRPr lang="de-CH"/>
+          </a:p>
+        </p:txBody>
+      </p:sp>
+      <p:sp>
+        <p:nvSpPr>
+          <p:cNvPr id="3" name="Titel 2"/>
+          <p:cNvSpPr>
+            <a:spLocks noGrp="1"/>
+          </p:cNvSpPr>
+          <p:nvPr>
+            <p:ph type="title"/>
+          </p:nvPr>
+        </p:nvSpPr>
+        <p:spPr/>
+        <p:txBody>
+          <a:bodyPr/>
+          <a:lstStyle/>
+          <a:p>
+            <a:r>
+              <a:rPr lang="de-CH" dirty="0" smtClean="0"/>
+              <a:t>Systemtest</a:t>
+            </a:r>
+            <a:endParaRPr lang="de-CH" dirty="0"/>
+          </a:p>
+        </p:txBody>
+      </p:sp>
+    </p:spTree>
+    <p:extLst>
+      <p:ext uri="{BB962C8B-B14F-4D97-AF65-F5344CB8AC3E}">
+        <p14:creationId xmlns:p14="http://schemas.microsoft.com/office/powerpoint/2010/main" val="2835939076"/>
+      </p:ext>
+    </p:extLst>
+  </p:cSld>
+  <p:clrMapOvr>
+    <a:masterClrMapping/>
+  </p:clrMapOvr>
+  <p:transition/>
+</p:sld>
+</file>
+
+<file path=ppt/slides/slide16.xml><?xml version="1.0" encoding="utf-8"?>
+<p:sld xmlns:a="http://schemas.openxmlformats.org/drawingml/2006/main" xmlns:r="http://schemas.openxmlformats.org/officeDocument/2006/relationships" xmlns:p="http://schemas.openxmlformats.org/presentationml/2006/main">
+  <p:cSld>
+    <p:spTree>
+      <p:nvGrpSpPr>
+        <p:cNvPr id="1" name=""/>
+        <p:cNvGrpSpPr/>
+        <p:nvPr/>
+      </p:nvGrpSpPr>
+      <p:grpSpPr>
+        <a:xfrm>
+          <a:off x="0" y="0"/>
+          <a:ext cx="0" cy="0"/>
+          <a:chOff x="0" y="0"/>
+          <a:chExt cx="0" cy="0"/>
+        </a:xfrm>
+      </p:grpSpPr>
+      <p:sp>
+        <p:nvSpPr>
+          <p:cNvPr id="2" name="Inhaltsplatzhalter 1"/>
+          <p:cNvSpPr>
+            <a:spLocks noGrp="1"/>
+          </p:cNvSpPr>
+          <p:nvPr>
+            <p:ph idx="1"/>
+          </p:nvPr>
+        </p:nvSpPr>
+        <p:spPr/>
+        <p:txBody>
+          <a:bodyPr/>
+          <a:lstStyle/>
+          <a:p>
+            <a:endParaRPr lang="de-CH"/>
+          </a:p>
+        </p:txBody>
+      </p:sp>
+      <p:sp>
+        <p:nvSpPr>
+          <p:cNvPr id="3" name="Titel 2"/>
+          <p:cNvSpPr>
+            <a:spLocks noGrp="1"/>
+          </p:cNvSpPr>
+          <p:nvPr>
+            <p:ph type="title"/>
+          </p:nvPr>
+        </p:nvSpPr>
+        <p:spPr/>
+        <p:txBody>
+          <a:bodyPr/>
+          <a:lstStyle/>
+          <a:p>
+            <a:r>
+              <a:rPr lang="de-CH" dirty="0" smtClean="0"/>
+              <a:t>Unit Tests</a:t>
+            </a:r>
+            <a:endParaRPr lang="de-CH" dirty="0"/>
+          </a:p>
+        </p:txBody>
+      </p:sp>
+    </p:spTree>
+    <p:extLst>
+      <p:ext uri="{BB962C8B-B14F-4D97-AF65-F5344CB8AC3E}">
+        <p14:creationId xmlns:p14="http://schemas.microsoft.com/office/powerpoint/2010/main" val="755503688"/>
+      </p:ext>
+    </p:extLst>
+  </p:cSld>
+  <p:clrMapOvr>
+    <a:masterClrMapping/>
+  </p:clrMapOvr>
+  <p:transition/>
+</p:sld>
+</file>
+
+<file path=ppt/slides/slide17.xml><?xml version="1.0" encoding="utf-8"?>
+<p:sld xmlns:a="http://schemas.openxmlformats.org/drawingml/2006/main" xmlns:r="http://schemas.openxmlformats.org/officeDocument/2006/relationships" xmlns:p="http://schemas.openxmlformats.org/presentationml/2006/main">
+  <p:cSld>
+    <p:spTree>
+      <p:nvGrpSpPr>
+        <p:cNvPr id="1" name=""/>
+        <p:cNvGrpSpPr/>
+        <p:nvPr/>
+      </p:nvGrpSpPr>
+      <p:grpSpPr>
+        <a:xfrm>
+          <a:off x="0" y="0"/>
+          <a:ext cx="0" cy="0"/>
+          <a:chOff x="0" y="0"/>
+          <a:chExt cx="0" cy="0"/>
+        </a:xfrm>
+      </p:grpSpPr>
+      <p:sp>
+        <p:nvSpPr>
+          <p:cNvPr id="2" name="Inhaltsplatzhalter 1"/>
+          <p:cNvSpPr>
+            <a:spLocks noGrp="1"/>
+          </p:cNvSpPr>
+          <p:nvPr>
+            <p:ph idx="1"/>
+          </p:nvPr>
+        </p:nvSpPr>
+        <p:spPr/>
+        <p:txBody>
+          <a:bodyPr/>
+          <a:lstStyle/>
+          <a:p>
+            <a:endParaRPr lang="de-CH"/>
+          </a:p>
+        </p:txBody>
+      </p:sp>
+      <p:sp>
+        <p:nvSpPr>
+          <p:cNvPr id="3" name="Titel 2"/>
+          <p:cNvSpPr>
+            <a:spLocks noGrp="1"/>
+          </p:cNvSpPr>
+          <p:nvPr>
+            <p:ph type="title"/>
+          </p:nvPr>
+        </p:nvSpPr>
+        <p:spPr/>
+        <p:txBody>
+          <a:bodyPr/>
+          <a:lstStyle/>
+          <a:p>
+            <a:r>
+              <a:rPr lang="de-CH" dirty="0" smtClean="0"/>
+              <a:t>Live-Demo</a:t>
+            </a:r>
+            <a:endParaRPr lang="de-CH" dirty="0"/>
+          </a:p>
+        </p:txBody>
+      </p:sp>
+    </p:spTree>
+    <p:extLst>
+      <p:ext uri="{BB962C8B-B14F-4D97-AF65-F5344CB8AC3E}">
+        <p14:creationId xmlns:p14="http://schemas.microsoft.com/office/powerpoint/2010/main" val="2697756913"/>
       </p:ext>
     </p:extLst>
   </p:cSld>
@@ -36660,33 +37403,97 @@
         </p:nvSpPr>
         <p:spPr/>
         <p:txBody>
-          <a:bodyPr/>
-          <a:lstStyle/>
-          <a:p>
-            <a:endParaRPr lang="de-CH"/>
-          </a:p>
-        </p:txBody>
-      </p:sp>
-      <p:sp>
-        <p:nvSpPr>
-          <p:cNvPr id="2" name="Titel 1"/>
-          <p:cNvSpPr>
-            <a:spLocks noGrp="1"/>
-          </p:cNvSpPr>
-          <p:nvPr>
-            <p:ph type="title"/>
-          </p:nvPr>
-        </p:nvSpPr>
-        <p:spPr/>
-        <p:txBody>
           <a:bodyPr>
             <a:normAutofit/>
           </a:bodyPr>
           <a:lstStyle/>
           <a:p>
             <a:r>
-              <a:rPr lang="de-CH" dirty="0" err="1" smtClean="0"/>
-              <a:t>Blaa</a:t>
+              <a:rPr lang="de-CH" sz="3000" dirty="0" smtClean="0"/>
+              <a:t>Ziele, Risiken, Funktionalität</a:t>
+            </a:r>
+            <a:endParaRPr lang="de-CH" sz="3000" dirty="0" smtClean="0"/>
+          </a:p>
+          <a:p>
+            <a:r>
+              <a:rPr lang="de-CH" sz="3000" dirty="0" smtClean="0"/>
+              <a:t>Architektur</a:t>
+            </a:r>
+            <a:endParaRPr lang="de-CH" sz="2600" dirty="0" smtClean="0"/>
+          </a:p>
+          <a:p>
+            <a:pPr lvl="1"/>
+            <a:r>
+              <a:rPr lang="de-CH" sz="2600" dirty="0" smtClean="0"/>
+              <a:t>Packages (</a:t>
+            </a:r>
+            <a:r>
+              <a:rPr lang="de-CH" sz="2600" dirty="0" err="1" smtClean="0"/>
+              <a:t>Layers</a:t>
+            </a:r>
+            <a:r>
+              <a:rPr lang="de-CH" sz="2600" dirty="0" smtClean="0"/>
+              <a:t>, Tiers)</a:t>
+            </a:r>
+          </a:p>
+          <a:p>
+            <a:pPr lvl="1"/>
+            <a:r>
+              <a:rPr lang="de-CH" sz="2600" dirty="0" smtClean="0"/>
+              <a:t>Problemdomain</a:t>
+            </a:r>
+          </a:p>
+          <a:p>
+            <a:pPr lvl="1"/>
+            <a:r>
+              <a:rPr lang="de-CH" sz="2600" dirty="0" smtClean="0"/>
+              <a:t>User Interface</a:t>
+            </a:r>
+          </a:p>
+          <a:p>
+            <a:r>
+              <a:rPr lang="de-CH" sz="3000" dirty="0" smtClean="0"/>
+              <a:t>Tests</a:t>
+            </a:r>
+          </a:p>
+          <a:p>
+            <a:r>
+              <a:rPr lang="de-CH" sz="3000" dirty="0" smtClean="0"/>
+              <a:t>Live-Demo</a:t>
+            </a:r>
+          </a:p>
+          <a:p>
+            <a:r>
+              <a:rPr lang="de-CH" sz="3000" dirty="0" smtClean="0"/>
+              <a:t>Projektstand</a:t>
+            </a:r>
+            <a:endParaRPr lang="de-CH" sz="3000" dirty="0"/>
+          </a:p>
+          <a:p>
+            <a:endParaRPr lang="de-CH" dirty="0" smtClean="0"/>
+          </a:p>
+        </p:txBody>
+      </p:sp>
+      <p:sp>
+        <p:nvSpPr>
+          <p:cNvPr id="2" name="Titel 1"/>
+          <p:cNvSpPr>
+            <a:spLocks noGrp="1"/>
+          </p:cNvSpPr>
+          <p:nvPr>
+            <p:ph type="title"/>
+          </p:nvPr>
+        </p:nvSpPr>
+        <p:spPr/>
+        <p:txBody>
+          <a:bodyPr>
+            <a:normAutofit/>
+          </a:bodyPr>
+          <a:lstStyle/>
+          <a:p>
+            <a:r>
+              <a:rPr lang="de-CH" dirty="0" smtClean="0"/>
+              <a:t>Inhalt</a:t>
             </a:r>
             <a:endParaRPr lang="de-CH" dirty="0"/>
           </a:p>
@@ -36703,6 +37510,878 @@
     <a:masterClrMapping/>
   </p:clrMapOvr>
   <p:transition/>
+  <p:timing>
+    <p:tnLst>
+      <p:par>
+        <p:cTn id="1" dur="indefinite" restart="never" nodeType="tmRoot"/>
+      </p:par>
+    </p:tnLst>
+  </p:timing>
+</p:sld>
+</file>
+
+<file path=ppt/slides/slide3.xml><?xml version="1.0" encoding="utf-8"?>
+<p:sld xmlns:a="http://schemas.openxmlformats.org/drawingml/2006/main" xmlns:r="http://schemas.openxmlformats.org/officeDocument/2006/relationships" xmlns:p="http://schemas.openxmlformats.org/presentationml/2006/main">
+  <p:cSld>
+    <p:spTree>
+      <p:nvGrpSpPr>
+        <p:cNvPr id="1" name=""/>
+        <p:cNvGrpSpPr/>
+        <p:nvPr/>
+      </p:nvGrpSpPr>
+      <p:grpSpPr>
+        <a:xfrm>
+          <a:off x="0" y="0"/>
+          <a:ext cx="0" cy="0"/>
+          <a:chOff x="0" y="0"/>
+          <a:chExt cx="0" cy="0"/>
+        </a:xfrm>
+      </p:grpSpPr>
+      <p:sp>
+        <p:nvSpPr>
+          <p:cNvPr id="2" name="Inhaltsplatzhalter 1"/>
+          <p:cNvSpPr>
+            <a:spLocks noGrp="1"/>
+          </p:cNvSpPr>
+          <p:nvPr>
+            <p:ph idx="1"/>
+          </p:nvPr>
+        </p:nvSpPr>
+        <p:spPr/>
+        <p:txBody>
+          <a:bodyPr/>
+          <a:lstStyle/>
+          <a:p>
+            <a:r>
+              <a:rPr lang="de-CH" dirty="0" smtClean="0"/>
+              <a:t>Technische Risiken eliminieren</a:t>
+            </a:r>
+          </a:p>
+          <a:p>
+            <a:r>
+              <a:rPr lang="de-CH" dirty="0" smtClean="0"/>
+              <a:t>Machbarkeit testen</a:t>
+            </a:r>
+          </a:p>
+          <a:p>
+            <a:endParaRPr lang="de-CH" dirty="0"/>
+          </a:p>
+          <a:p>
+            <a:pPr marL="109728" indent="0">
+              <a:buNone/>
+            </a:pPr>
+            <a:endParaRPr lang="de-CH" dirty="0" smtClean="0"/>
+          </a:p>
+          <a:p>
+            <a:endParaRPr lang="de-CH" dirty="0" smtClean="0"/>
+          </a:p>
+          <a:p>
+            <a:endParaRPr lang="de-CH" dirty="0"/>
+          </a:p>
+        </p:txBody>
+      </p:sp>
+      <p:sp>
+        <p:nvSpPr>
+          <p:cNvPr id="3" name="Titel 2"/>
+          <p:cNvSpPr>
+            <a:spLocks noGrp="1"/>
+          </p:cNvSpPr>
+          <p:nvPr>
+            <p:ph type="title"/>
+          </p:nvPr>
+        </p:nvSpPr>
+        <p:spPr/>
+        <p:txBody>
+          <a:bodyPr/>
+          <a:lstStyle/>
+          <a:p>
+            <a:r>
+              <a:rPr lang="de-CH" dirty="0" smtClean="0"/>
+              <a:t>Ziele</a:t>
+            </a:r>
+            <a:endParaRPr lang="de-CH" dirty="0"/>
+          </a:p>
+        </p:txBody>
+      </p:sp>
+    </p:spTree>
+    <p:extLst>
+      <p:ext uri="{BB962C8B-B14F-4D97-AF65-F5344CB8AC3E}">
+        <p14:creationId xmlns:p14="http://schemas.microsoft.com/office/powerpoint/2010/main" val="2857039303"/>
+      </p:ext>
+    </p:extLst>
+  </p:cSld>
+  <p:clrMapOvr>
+    <a:masterClrMapping/>
+  </p:clrMapOvr>
+  <p:transition/>
+  <p:timing>
+    <p:tnLst>
+      <p:par>
+        <p:cTn id="1" dur="indefinite" restart="never" nodeType="tmRoot"/>
+      </p:par>
+    </p:tnLst>
+  </p:timing>
+</p:sld>
+</file>
+
+<file path=ppt/slides/slide4.xml><?xml version="1.0" encoding="utf-8"?>
+<p:sld xmlns:a="http://schemas.openxmlformats.org/drawingml/2006/main" xmlns:r="http://schemas.openxmlformats.org/officeDocument/2006/relationships" xmlns:p="http://schemas.openxmlformats.org/presentationml/2006/main">
+  <p:cSld>
+    <p:spTree>
+      <p:nvGrpSpPr>
+        <p:cNvPr id="1" name=""/>
+        <p:cNvGrpSpPr/>
+        <p:nvPr/>
+      </p:nvGrpSpPr>
+      <p:grpSpPr>
+        <a:xfrm>
+          <a:off x="0" y="0"/>
+          <a:ext cx="0" cy="0"/>
+          <a:chOff x="0" y="0"/>
+          <a:chExt cx="0" cy="0"/>
+        </a:xfrm>
+      </p:grpSpPr>
+      <p:sp>
+        <p:nvSpPr>
+          <p:cNvPr id="2" name="Inhaltsplatzhalter 1"/>
+          <p:cNvSpPr>
+            <a:spLocks noGrp="1"/>
+          </p:cNvSpPr>
+          <p:nvPr>
+            <p:ph idx="1"/>
+          </p:nvPr>
+        </p:nvSpPr>
+        <p:spPr/>
+        <p:txBody>
+          <a:bodyPr/>
+          <a:lstStyle/>
+          <a:p>
+            <a:r>
+              <a:rPr lang="de-CH" dirty="0" smtClean="0"/>
+              <a:t>Unterbruch während Übertragung eines Zeiteintrag</a:t>
+            </a:r>
+          </a:p>
+          <a:p>
+            <a:r>
+              <a:rPr lang="de-CH" dirty="0" smtClean="0"/>
+              <a:t>JSON </a:t>
+            </a:r>
+            <a:r>
+              <a:rPr lang="de-CH" dirty="0" err="1" smtClean="0"/>
+              <a:t>Serialisierung</a:t>
+            </a:r>
+            <a:endParaRPr lang="de-CH" dirty="0" smtClean="0"/>
+          </a:p>
+          <a:p>
+            <a:r>
+              <a:rPr lang="de-CH" dirty="0" smtClean="0"/>
+              <a:t>Dateninkonsistenz</a:t>
+            </a:r>
+          </a:p>
+          <a:p>
+            <a:endParaRPr lang="de-CH" dirty="0" smtClean="0"/>
+          </a:p>
+          <a:p>
+            <a:endParaRPr lang="de-CH" dirty="0" smtClean="0"/>
+          </a:p>
+          <a:p>
+            <a:endParaRPr lang="de-CH" dirty="0"/>
+          </a:p>
+        </p:txBody>
+      </p:sp>
+      <p:sp>
+        <p:nvSpPr>
+          <p:cNvPr id="3" name="Titel 2"/>
+          <p:cNvSpPr>
+            <a:spLocks noGrp="1"/>
+          </p:cNvSpPr>
+          <p:nvPr>
+            <p:ph type="title"/>
+          </p:nvPr>
+        </p:nvSpPr>
+        <p:spPr/>
+        <p:txBody>
+          <a:bodyPr/>
+          <a:lstStyle/>
+          <a:p>
+            <a:r>
+              <a:rPr lang="de-CH" dirty="0" smtClean="0"/>
+              <a:t>Risiken</a:t>
+            </a:r>
+            <a:endParaRPr lang="de-CH" dirty="0"/>
+          </a:p>
+        </p:txBody>
+      </p:sp>
+    </p:spTree>
+    <p:extLst>
+      <p:ext uri="{BB962C8B-B14F-4D97-AF65-F5344CB8AC3E}">
+        <p14:creationId xmlns:p14="http://schemas.microsoft.com/office/powerpoint/2010/main" val="4148578029"/>
+      </p:ext>
+    </p:extLst>
+  </p:cSld>
+  <p:clrMapOvr>
+    <a:masterClrMapping/>
+  </p:clrMapOvr>
+  <p:transition/>
+  <p:timing>
+    <p:tnLst>
+      <p:par>
+        <p:cTn id="1" dur="indefinite" restart="never" nodeType="tmRoot"/>
+      </p:par>
+    </p:tnLst>
+  </p:timing>
+</p:sld>
+</file>
+
+<file path=ppt/slides/slide5.xml><?xml version="1.0" encoding="utf-8"?>
+<p:sld xmlns:a="http://schemas.openxmlformats.org/drawingml/2006/main" xmlns:r="http://schemas.openxmlformats.org/officeDocument/2006/relationships" xmlns:p="http://schemas.openxmlformats.org/presentationml/2006/main">
+  <p:cSld>
+    <p:spTree>
+      <p:nvGrpSpPr>
+        <p:cNvPr id="1" name=""/>
+        <p:cNvGrpSpPr/>
+        <p:nvPr/>
+      </p:nvGrpSpPr>
+      <p:grpSpPr>
+        <a:xfrm>
+          <a:off x="0" y="0"/>
+          <a:ext cx="0" cy="0"/>
+          <a:chOff x="0" y="0"/>
+          <a:chExt cx="0" cy="0"/>
+        </a:xfrm>
+      </p:grpSpPr>
+      <p:pic>
+        <p:nvPicPr>
+          <p:cNvPr id="7" name="Grafik 6"/>
+          <p:cNvPicPr/>
+          <p:nvPr/>
+        </p:nvPicPr>
+        <p:blipFill rotWithShape="1">
+          <a:blip r:embed="rId2">
+            <a:extLst>
+              <a:ext uri="{28A0092B-C50C-407E-A947-70E740481C1C}">
+                <a14:useLocalDpi xmlns:a14="http://schemas.microsoft.com/office/drawing/2010/main" val="0"/>
+              </a:ext>
+            </a:extLst>
+          </a:blip>
+          <a:srcRect b="19869"/>
+          <a:stretch/>
+        </p:blipFill>
+        <p:spPr bwMode="auto">
+          <a:xfrm>
+            <a:off x="251520" y="0"/>
+            <a:ext cx="6984776" cy="6741368"/>
+          </a:xfrm>
+          <a:prstGeom prst="rect">
+            <a:avLst/>
+          </a:prstGeom>
+          <a:noFill/>
+          <a:ln>
+            <a:noFill/>
+          </a:ln>
+          <a:extLst>
+            <a:ext uri="{53640926-AAD7-44D8-BBD7-CCE9431645EC}">
+              <a14:shadowObscured xmlns:a14="http://schemas.microsoft.com/office/drawing/2010/main"/>
+            </a:ext>
+          </a:extLst>
+        </p:spPr>
+      </p:pic>
+    </p:spTree>
+    <p:extLst>
+      <p:ext uri="{BB962C8B-B14F-4D97-AF65-F5344CB8AC3E}">
+        <p14:creationId xmlns:p14="http://schemas.microsoft.com/office/powerpoint/2010/main" val="613654050"/>
+      </p:ext>
+    </p:extLst>
+  </p:cSld>
+  <p:clrMapOvr>
+    <a:masterClrMapping/>
+  </p:clrMapOvr>
+  <p:transition/>
+  <p:timing>
+    <p:tnLst>
+      <p:par>
+        <p:cTn id="1" dur="indefinite" restart="never" nodeType="tmRoot"/>
+      </p:par>
+    </p:tnLst>
+  </p:timing>
+</p:sld>
+</file>
+
+<file path=ppt/slides/slide6.xml><?xml version="1.0" encoding="utf-8"?>
+<p:sld xmlns:a="http://schemas.openxmlformats.org/drawingml/2006/main" xmlns:r="http://schemas.openxmlformats.org/officeDocument/2006/relationships" xmlns:p="http://schemas.openxmlformats.org/presentationml/2006/main">
+  <p:cSld>
+    <p:spTree>
+      <p:nvGrpSpPr>
+        <p:cNvPr id="1" name=""/>
+        <p:cNvGrpSpPr/>
+        <p:nvPr/>
+      </p:nvGrpSpPr>
+      <p:grpSpPr>
+        <a:xfrm>
+          <a:off x="0" y="0"/>
+          <a:ext cx="0" cy="0"/>
+          <a:chOff x="0" y="0"/>
+          <a:chExt cx="0" cy="0"/>
+        </a:xfrm>
+      </p:grpSpPr>
+      <p:pic>
+        <p:nvPicPr>
+          <p:cNvPr id="4" name="Grafik 3"/>
+          <p:cNvPicPr/>
+          <p:nvPr/>
+        </p:nvPicPr>
+        <p:blipFill>
+          <a:blip r:embed="rId2">
+            <a:extLst>
+              <a:ext uri="{28A0092B-C50C-407E-A947-70E740481C1C}">
+                <a14:useLocalDpi xmlns:a14="http://schemas.microsoft.com/office/drawing/2010/main" val="0"/>
+              </a:ext>
+            </a:extLst>
+          </a:blip>
+          <a:srcRect/>
+          <a:stretch>
+            <a:fillRect/>
+          </a:stretch>
+        </p:blipFill>
+        <p:spPr bwMode="auto">
+          <a:xfrm>
+            <a:off x="251520" y="188640"/>
+            <a:ext cx="8064896" cy="6552728"/>
+          </a:xfrm>
+          <a:prstGeom prst="rect">
+            <a:avLst/>
+          </a:prstGeom>
+          <a:noFill/>
+          <a:ln>
+            <a:noFill/>
+          </a:ln>
+        </p:spPr>
+      </p:pic>
+    </p:spTree>
+    <p:extLst>
+      <p:ext uri="{BB962C8B-B14F-4D97-AF65-F5344CB8AC3E}">
+        <p14:creationId xmlns:p14="http://schemas.microsoft.com/office/powerpoint/2010/main" val="4031105902"/>
+      </p:ext>
+    </p:extLst>
+  </p:cSld>
+  <p:clrMapOvr>
+    <a:masterClrMapping/>
+  </p:clrMapOvr>
+  <p:transition/>
+  <p:timing>
+    <p:tnLst>
+      <p:par>
+        <p:cTn id="1" dur="indefinite" restart="never" nodeType="tmRoot"/>
+      </p:par>
+    </p:tnLst>
+  </p:timing>
+</p:sld>
+</file>
+
+<file path=ppt/slides/slide7.xml><?xml version="1.0" encoding="utf-8"?>
+<p:sld xmlns:a="http://schemas.openxmlformats.org/drawingml/2006/main" xmlns:r="http://schemas.openxmlformats.org/officeDocument/2006/relationships" xmlns:p="http://schemas.openxmlformats.org/presentationml/2006/main">
+  <p:cSld>
+    <p:spTree>
+      <p:nvGrpSpPr>
+        <p:cNvPr id="1" name=""/>
+        <p:cNvGrpSpPr/>
+        <p:nvPr/>
+      </p:nvGrpSpPr>
+      <p:grpSpPr>
+        <a:xfrm>
+          <a:off x="0" y="0"/>
+          <a:ext cx="0" cy="0"/>
+          <a:chOff x="0" y="0"/>
+          <a:chExt cx="0" cy="0"/>
+        </a:xfrm>
+      </p:grpSpPr>
+      <p:sp>
+        <p:nvSpPr>
+          <p:cNvPr id="2" name="Inhaltsplatzhalter 1"/>
+          <p:cNvSpPr>
+            <a:spLocks noGrp="1"/>
+          </p:cNvSpPr>
+          <p:nvPr>
+            <p:ph idx="1"/>
+          </p:nvPr>
+        </p:nvSpPr>
+        <p:spPr/>
+        <p:txBody>
+          <a:bodyPr/>
+          <a:lstStyle/>
+          <a:p>
+            <a:r>
+              <a:rPr lang="de-CH" dirty="0"/>
+              <a:t>Übertragung eines Zeiteintrags</a:t>
+            </a:r>
+          </a:p>
+          <a:p>
+            <a:r>
+              <a:rPr lang="de-CH" dirty="0"/>
+              <a:t>Simples, funktionsfähiges GUI</a:t>
+            </a:r>
+          </a:p>
+          <a:p>
+            <a:r>
+              <a:rPr lang="de-CH" dirty="0"/>
+              <a:t>Anzeigen Zeiteinträge in Datenbank</a:t>
+            </a:r>
+          </a:p>
+          <a:p>
+            <a:r>
+              <a:rPr lang="de-CH" dirty="0"/>
+              <a:t>CRUD Zeiteintrag auf Server</a:t>
+            </a:r>
+          </a:p>
+          <a:p>
+            <a:pPr marL="109728" indent="0">
+              <a:buNone/>
+            </a:pPr>
+            <a:endParaRPr lang="de-CH" dirty="0"/>
+          </a:p>
+        </p:txBody>
+      </p:sp>
+      <p:sp>
+        <p:nvSpPr>
+          <p:cNvPr id="3" name="Titel 2"/>
+          <p:cNvSpPr>
+            <a:spLocks noGrp="1"/>
+          </p:cNvSpPr>
+          <p:nvPr>
+            <p:ph type="title"/>
+          </p:nvPr>
+        </p:nvSpPr>
+        <p:spPr/>
+        <p:txBody>
+          <a:bodyPr/>
+          <a:lstStyle/>
+          <a:p>
+            <a:r>
+              <a:rPr lang="de-CH" dirty="0" smtClean="0"/>
+              <a:t>Funktionalität</a:t>
+            </a:r>
+            <a:endParaRPr lang="de-CH" dirty="0"/>
+          </a:p>
+        </p:txBody>
+      </p:sp>
+    </p:spTree>
+    <p:extLst>
+      <p:ext uri="{BB962C8B-B14F-4D97-AF65-F5344CB8AC3E}">
+        <p14:creationId xmlns:p14="http://schemas.microsoft.com/office/powerpoint/2010/main" val="799700918"/>
+      </p:ext>
+    </p:extLst>
+  </p:cSld>
+  <p:clrMapOvr>
+    <a:masterClrMapping/>
+  </p:clrMapOvr>
+  <p:transition/>
+  <p:timing>
+    <p:tnLst>
+      <p:par>
+        <p:cTn id="1" dur="indefinite" restart="never" nodeType="tmRoot"/>
+      </p:par>
+    </p:tnLst>
+  </p:timing>
+</p:sld>
+</file>
+
+<file path=ppt/slides/slide8.xml><?xml version="1.0" encoding="utf-8"?>
+<p:sld xmlns:a="http://schemas.openxmlformats.org/drawingml/2006/main" xmlns:r="http://schemas.openxmlformats.org/officeDocument/2006/relationships" xmlns:p="http://schemas.openxmlformats.org/presentationml/2006/main">
+  <p:cSld>
+    <p:spTree>
+      <p:nvGrpSpPr>
+        <p:cNvPr id="1" name=""/>
+        <p:cNvGrpSpPr/>
+        <p:nvPr/>
+      </p:nvGrpSpPr>
+      <p:grpSpPr>
+        <a:xfrm>
+          <a:off x="0" y="0"/>
+          <a:ext cx="0" cy="0"/>
+          <a:chOff x="0" y="0"/>
+          <a:chExt cx="0" cy="0"/>
+        </a:xfrm>
+      </p:grpSpPr>
+      <p:sp>
+        <p:nvSpPr>
+          <p:cNvPr id="3" name="Titel 2"/>
+          <p:cNvSpPr>
+            <a:spLocks noGrp="1"/>
+          </p:cNvSpPr>
+          <p:nvPr>
+            <p:ph type="title"/>
+          </p:nvPr>
+        </p:nvSpPr>
+        <p:spPr/>
+        <p:txBody>
+          <a:bodyPr/>
+          <a:lstStyle/>
+          <a:p>
+            <a:r>
+              <a:rPr lang="de-CH" dirty="0" smtClean="0"/>
+              <a:t>Architektur</a:t>
+            </a:r>
+            <a:endParaRPr lang="de-CH" dirty="0"/>
+          </a:p>
+        </p:txBody>
+      </p:sp>
+      <p:grpSp>
+        <p:nvGrpSpPr>
+          <p:cNvPr id="4" name="Gruppieren 3"/>
+          <p:cNvGrpSpPr/>
+          <p:nvPr/>
+        </p:nvGrpSpPr>
+        <p:grpSpPr>
+          <a:xfrm>
+            <a:off x="3712840" y="1325457"/>
+            <a:ext cx="4392488" cy="5040560"/>
+            <a:chOff x="0" y="0"/>
+            <a:chExt cx="4295775" cy="5161894"/>
+          </a:xfrm>
+        </p:grpSpPr>
+        <p:pic>
+          <p:nvPicPr>
+            <p:cNvPr id="5" name="Grafik 4"/>
+            <p:cNvPicPr>
+              <a:picLocks noChangeAspect="1"/>
+            </p:cNvPicPr>
+            <p:nvPr/>
+          </p:nvPicPr>
+          <p:blipFill>
+            <a:blip r:embed="rId2">
+              <a:extLst>
+                <a:ext uri="{28A0092B-C50C-407E-A947-70E740481C1C}">
+                  <a14:useLocalDpi xmlns:a14="http://schemas.microsoft.com/office/drawing/2010/main" val="0"/>
+                </a:ext>
+              </a:extLst>
+            </a:blip>
+            <a:stretch>
+              <a:fillRect/>
+            </a:stretch>
+          </p:blipFill>
+          <p:spPr>
+            <a:xfrm>
+              <a:off x="0" y="0"/>
+              <a:ext cx="4295553" cy="4933507"/>
+            </a:xfrm>
+            <a:prstGeom prst="rect">
+              <a:avLst/>
+            </a:prstGeom>
+          </p:spPr>
+        </p:pic>
+        <p:sp>
+          <p:nvSpPr>
+            <p:cNvPr id="6" name="Textfeld 33"/>
+            <p:cNvSpPr txBox="1"/>
+            <p:nvPr/>
+          </p:nvSpPr>
+          <p:spPr>
+            <a:xfrm>
+              <a:off x="0" y="4986653"/>
+              <a:ext cx="4295775" cy="175241"/>
+            </a:xfrm>
+            <a:prstGeom prst="rect">
+              <a:avLst/>
+            </a:prstGeom>
+            <a:solidFill>
+              <a:prstClr val="white"/>
+            </a:solidFill>
+            <a:ln>
+              <a:noFill/>
+            </a:ln>
+            <a:effectLst/>
+          </p:spPr>
+          <p:txBody>
+            <a:bodyPr rot="0" spcFirstLastPara="0" vert="horz" wrap="square" lIns="0" tIns="0" rIns="0" bIns="0" numCol="1" spcCol="0" rtlCol="0" fromWordArt="0" anchor="t" anchorCtr="0" forceAA="0" compatLnSpc="1">
+              <a:prstTxWarp prst="textNoShape">
+                <a:avLst/>
+              </a:prstTxWarp>
+              <a:spAutoFit/>
+            </a:bodyPr>
+            <a:lstStyle/>
+            <a:p>
+              <a:pPr>
+                <a:spcAft>
+                  <a:spcPts val="400"/>
+                </a:spcAft>
+              </a:pPr>
+              <a:r>
+                <a:rPr lang="de-CH" sz="800" b="1" u="sng">
+                  <a:solidFill>
+                    <a:srgbClr val="365F91"/>
+                  </a:solidFill>
+                  <a:effectLst/>
+                  <a:latin typeface="Calibri"/>
+                  <a:ea typeface="Times New Roman"/>
+                  <a:cs typeface="Times New Roman"/>
+                </a:rPr>
+                <a:t>Abbildung </a:t>
+              </a:r>
+              <a:r>
+                <a:rPr lang="de-CH" sz="800" b="1">
+                  <a:solidFill>
+                    <a:srgbClr val="365F91"/>
+                  </a:solidFill>
+                  <a:effectLst/>
+                  <a:latin typeface="Calibri"/>
+                  <a:ea typeface="Times New Roman"/>
+                  <a:cs typeface="Times New Roman"/>
+                </a:rPr>
+                <a:t>1 - Architekturübersicht</a:t>
+              </a:r>
+            </a:p>
+          </p:txBody>
+        </p:sp>
+      </p:grpSp>
+      <p:sp>
+        <p:nvSpPr>
+          <p:cNvPr id="7" name="Inhaltsplatzhalter 1"/>
+          <p:cNvSpPr>
+            <a:spLocks noGrp="1"/>
+          </p:cNvSpPr>
+          <p:nvPr>
+            <p:ph idx="1"/>
+          </p:nvPr>
+        </p:nvSpPr>
+        <p:spPr>
+          <a:xfrm>
+            <a:off x="323528" y="1772816"/>
+            <a:ext cx="3672408" cy="1961411"/>
+          </a:xfrm>
+        </p:spPr>
+        <p:txBody>
+          <a:bodyPr>
+            <a:normAutofit fontScale="92500"/>
+          </a:bodyPr>
+          <a:lstStyle/>
+          <a:p>
+            <a:r>
+              <a:rPr lang="en-US" dirty="0" smtClean="0"/>
+              <a:t>Webserver</a:t>
+            </a:r>
+            <a:r>
+              <a:rPr lang="de-CH" dirty="0"/>
+              <a:t> </a:t>
+            </a:r>
+            <a:r>
+              <a:rPr lang="fr-CH" dirty="0" smtClean="0"/>
+              <a:t>(Apache)</a:t>
+            </a:r>
+          </a:p>
+          <a:p>
+            <a:r>
+              <a:rPr lang="fr-CH" dirty="0" err="1" smtClean="0"/>
+              <a:t>Database</a:t>
+            </a:r>
+            <a:r>
+              <a:rPr lang="fr-CH" dirty="0" smtClean="0"/>
+              <a:t> in MySQL</a:t>
+            </a:r>
+          </a:p>
+          <a:p>
+            <a:r>
+              <a:rPr lang="fr-CH" dirty="0" err="1" smtClean="0"/>
+              <a:t>Android</a:t>
+            </a:r>
+            <a:r>
+              <a:rPr lang="fr-CH" dirty="0" smtClean="0"/>
+              <a:t> mit </a:t>
+            </a:r>
+            <a:r>
+              <a:rPr lang="fr-CH" dirty="0" err="1" smtClean="0"/>
+              <a:t>lokalem</a:t>
+            </a:r>
+            <a:r>
+              <a:rPr lang="fr-CH" dirty="0" smtClean="0"/>
+              <a:t> Cache</a:t>
+            </a:r>
+            <a:endParaRPr lang="de-CH" dirty="0"/>
+          </a:p>
+        </p:txBody>
+      </p:sp>
+    </p:spTree>
+    <p:extLst>
+      <p:ext uri="{BB962C8B-B14F-4D97-AF65-F5344CB8AC3E}">
+        <p14:creationId xmlns:p14="http://schemas.microsoft.com/office/powerpoint/2010/main" val="894457348"/>
+      </p:ext>
+    </p:extLst>
+  </p:cSld>
+  <p:clrMapOvr>
+    <a:masterClrMapping/>
+  </p:clrMapOvr>
+  <p:transition/>
+  <p:timing>
+    <p:tnLst>
+      <p:par>
+        <p:cTn id="1" dur="indefinite" restart="never" nodeType="tmRoot"/>
+      </p:par>
+    </p:tnLst>
+  </p:timing>
+</p:sld>
+</file>
+
+<file path=ppt/slides/slide9.xml><?xml version="1.0" encoding="utf-8"?>
+<p:sld xmlns:a="http://schemas.openxmlformats.org/drawingml/2006/main" xmlns:r="http://schemas.openxmlformats.org/officeDocument/2006/relationships" xmlns:p="http://schemas.openxmlformats.org/presentationml/2006/main">
+  <p:cSld>
+    <p:spTree>
+      <p:nvGrpSpPr>
+        <p:cNvPr id="1" name=""/>
+        <p:cNvGrpSpPr/>
+        <p:nvPr/>
+      </p:nvGrpSpPr>
+      <p:grpSpPr>
+        <a:xfrm>
+          <a:off x="0" y="0"/>
+          <a:ext cx="0" cy="0"/>
+          <a:chOff x="0" y="0"/>
+          <a:chExt cx="0" cy="0"/>
+        </a:xfrm>
+      </p:grpSpPr>
+      <p:sp>
+        <p:nvSpPr>
+          <p:cNvPr id="2" name="Inhaltsplatzhalter 1"/>
+          <p:cNvSpPr>
+            <a:spLocks noGrp="1"/>
+          </p:cNvSpPr>
+          <p:nvPr>
+            <p:ph idx="1"/>
+          </p:nvPr>
+        </p:nvSpPr>
+        <p:spPr>
+          <a:xfrm>
+            <a:off x="457200" y="1481329"/>
+            <a:ext cx="7355160" cy="2379719"/>
+          </a:xfrm>
+        </p:spPr>
+        <p:txBody>
+          <a:bodyPr/>
+          <a:lstStyle/>
+          <a:p>
+            <a:r>
+              <a:rPr lang="de-CH" dirty="0" smtClean="0"/>
+              <a:t>Protokoll HTTP 1.1</a:t>
+            </a:r>
+          </a:p>
+          <a:p>
+            <a:r>
+              <a:rPr lang="de-CH" dirty="0" smtClean="0"/>
+              <a:t>Client: </a:t>
+            </a:r>
+            <a:r>
+              <a:rPr lang="de-CH" dirty="0" err="1" smtClean="0"/>
+              <a:t>Android</a:t>
+            </a:r>
+            <a:r>
+              <a:rPr lang="de-CH" dirty="0" smtClean="0"/>
+              <a:t> Version 2.2</a:t>
+            </a:r>
+          </a:p>
+          <a:p>
+            <a:pPr lvl="1"/>
+            <a:r>
+              <a:rPr lang="de-CH" dirty="0" smtClean="0"/>
+              <a:t>Anwendung: </a:t>
+            </a:r>
+            <a:r>
+              <a:rPr lang="de-CH" dirty="0" err="1" smtClean="0"/>
+              <a:t>mrt.apk</a:t>
+            </a:r>
+            <a:endParaRPr lang="de-CH" dirty="0" smtClean="0"/>
+          </a:p>
+          <a:p>
+            <a:r>
+              <a:rPr lang="de-CH" dirty="0" smtClean="0"/>
+              <a:t>Server: Linux mit Apache</a:t>
+            </a:r>
+          </a:p>
+          <a:p>
+            <a:pPr lvl="1"/>
+            <a:r>
+              <a:rPr lang="de-CH" dirty="0" smtClean="0"/>
+              <a:t>Anwendung: </a:t>
+            </a:r>
+            <a:r>
+              <a:rPr lang="de-CH" dirty="0" err="1" smtClean="0"/>
+              <a:t>rails_app</a:t>
+            </a:r>
+            <a:endParaRPr lang="de-CH" dirty="0" smtClean="0"/>
+          </a:p>
+        </p:txBody>
+      </p:sp>
+      <p:sp>
+        <p:nvSpPr>
+          <p:cNvPr id="3" name="Titel 2"/>
+          <p:cNvSpPr>
+            <a:spLocks noGrp="1"/>
+          </p:cNvSpPr>
+          <p:nvPr>
+            <p:ph type="title"/>
+          </p:nvPr>
+        </p:nvSpPr>
+        <p:spPr/>
+        <p:txBody>
+          <a:bodyPr/>
+          <a:lstStyle/>
+          <a:p>
+            <a:r>
+              <a:rPr lang="de-CH" dirty="0" smtClean="0"/>
+              <a:t>Tiers</a:t>
+            </a:r>
+            <a:endParaRPr lang="de-CH" dirty="0"/>
+          </a:p>
+        </p:txBody>
+      </p:sp>
+      <p:pic>
+        <p:nvPicPr>
+          <p:cNvPr id="4" name="Grafik 3"/>
+          <p:cNvPicPr/>
+          <p:nvPr/>
+        </p:nvPicPr>
+        <p:blipFill>
+          <a:blip r:embed="rId2">
+            <a:extLst>
+              <a:ext uri="{28A0092B-C50C-407E-A947-70E740481C1C}">
+                <a14:useLocalDpi xmlns:a14="http://schemas.microsoft.com/office/drawing/2010/main" val="0"/>
+              </a:ext>
+            </a:extLst>
+          </a:blip>
+          <a:srcRect/>
+          <a:stretch>
+            <a:fillRect/>
+          </a:stretch>
+        </p:blipFill>
+        <p:spPr bwMode="auto">
+          <a:xfrm>
+            <a:off x="2123728" y="4149080"/>
+            <a:ext cx="4848225" cy="1776730"/>
+          </a:xfrm>
+          <a:prstGeom prst="rect">
+            <a:avLst/>
+          </a:prstGeom>
+          <a:noFill/>
+          <a:ln>
+            <a:noFill/>
+          </a:ln>
+        </p:spPr>
+      </p:pic>
+    </p:spTree>
+    <p:extLst>
+      <p:ext uri="{BB962C8B-B14F-4D97-AF65-F5344CB8AC3E}">
+        <p14:creationId xmlns:p14="http://schemas.microsoft.com/office/powerpoint/2010/main" val="3379927354"/>
+      </p:ext>
+    </p:extLst>
+  </p:cSld>
+  <p:clrMapOvr>
+    <a:masterClrMapping/>
+  </p:clrMapOvr>
+  <p:transition/>
+  <p:timing>
+    <p:tnLst>
+      <p:par>
+        <p:cTn id="1" dur="indefinite" restart="never" nodeType="tmRoot"/>
+      </p:par>
+    </p:tnLst>
+  </p:timing>
 </p:sld>
 </file>
 

</xml_diff>